<commit_message>
Update customer purchasing behavior notebook
</commit_message>
<xml_diff>
--- a/qtn_2/Customer_Purchasing_Behavior_Analysis.pptx
+++ b/qtn_2/Customer_Purchasing_Behavior_Analysis.pptx
@@ -324,7 +324,7 @@
           <a:p>
             <a:fld id="{5BCAD085-E8A6-8845-BD4E-CB4CCA059FC4}" type="datetimeFigureOut">
               <a:rPr lang="en-US" smtClean="0"/>
-              <a:t>12/12/2025</a:t>
+              <a:t>12/13/2025</a:t>
             </a:fld>
             <a:endParaRPr lang="en-US"/>
           </a:p>
@@ -492,7 +492,7 @@
           <a:p>
             <a:fld id="{5BCAD085-E8A6-8845-BD4E-CB4CCA059FC4}" type="datetimeFigureOut">
               <a:rPr lang="en-US" smtClean="0"/>
-              <a:t>12/12/2025</a:t>
+              <a:t>12/13/2025</a:t>
             </a:fld>
             <a:endParaRPr lang="en-US"/>
           </a:p>
@@ -670,7 +670,7 @@
           <a:p>
             <a:fld id="{5BCAD085-E8A6-8845-BD4E-CB4CCA059FC4}" type="datetimeFigureOut">
               <a:rPr lang="en-US" smtClean="0"/>
-              <a:t>12/12/2025</a:t>
+              <a:t>12/13/2025</a:t>
             </a:fld>
             <a:endParaRPr lang="en-US"/>
           </a:p>
@@ -838,7 +838,7 @@
           <a:p>
             <a:fld id="{5BCAD085-E8A6-8845-BD4E-CB4CCA059FC4}" type="datetimeFigureOut">
               <a:rPr lang="en-US" smtClean="0"/>
-              <a:t>12/12/2025</a:t>
+              <a:t>12/13/2025</a:t>
             </a:fld>
             <a:endParaRPr lang="en-US"/>
           </a:p>
@@ -1083,7 +1083,7 @@
           <a:p>
             <a:fld id="{5BCAD085-E8A6-8845-BD4E-CB4CCA059FC4}" type="datetimeFigureOut">
               <a:rPr lang="en-US" smtClean="0"/>
-              <a:t>12/12/2025</a:t>
+              <a:t>12/13/2025</a:t>
             </a:fld>
             <a:endParaRPr lang="en-US"/>
           </a:p>
@@ -1368,7 +1368,7 @@
           <a:p>
             <a:fld id="{5BCAD085-E8A6-8845-BD4E-CB4CCA059FC4}" type="datetimeFigureOut">
               <a:rPr lang="en-US" smtClean="0"/>
-              <a:t>12/12/2025</a:t>
+              <a:t>12/13/2025</a:t>
             </a:fld>
             <a:endParaRPr lang="en-US"/>
           </a:p>
@@ -1787,7 +1787,7 @@
           <a:p>
             <a:fld id="{5BCAD085-E8A6-8845-BD4E-CB4CCA059FC4}" type="datetimeFigureOut">
               <a:rPr lang="en-US" smtClean="0"/>
-              <a:t>12/12/2025</a:t>
+              <a:t>12/13/2025</a:t>
             </a:fld>
             <a:endParaRPr lang="en-US"/>
           </a:p>
@@ -1904,7 +1904,7 @@
           <a:p>
             <a:fld id="{5BCAD085-E8A6-8845-BD4E-CB4CCA059FC4}" type="datetimeFigureOut">
               <a:rPr lang="en-US" smtClean="0"/>
-              <a:t>12/12/2025</a:t>
+              <a:t>12/13/2025</a:t>
             </a:fld>
             <a:endParaRPr lang="en-US"/>
           </a:p>
@@ -1999,7 +1999,7 @@
           <a:p>
             <a:fld id="{5BCAD085-E8A6-8845-BD4E-CB4CCA059FC4}" type="datetimeFigureOut">
               <a:rPr lang="en-US" smtClean="0"/>
-              <a:t>12/12/2025</a:t>
+              <a:t>12/13/2025</a:t>
             </a:fld>
             <a:endParaRPr lang="en-US"/>
           </a:p>
@@ -2274,7 +2274,7 @@
           <a:p>
             <a:fld id="{5BCAD085-E8A6-8845-BD4E-CB4CCA059FC4}" type="datetimeFigureOut">
               <a:rPr lang="en-US" smtClean="0"/>
-              <a:t>12/12/2025</a:t>
+              <a:t>12/13/2025</a:t>
             </a:fld>
             <a:endParaRPr lang="en-US"/>
           </a:p>
@@ -2526,7 +2526,7 @@
           <a:p>
             <a:fld id="{5BCAD085-E8A6-8845-BD4E-CB4CCA059FC4}" type="datetimeFigureOut">
               <a:rPr lang="en-US" smtClean="0"/>
-              <a:t>12/12/2025</a:t>
+              <a:t>12/13/2025</a:t>
             </a:fld>
             <a:endParaRPr lang="en-US"/>
           </a:p>
@@ -2737,7 +2737,7 @@
           <a:p>
             <a:fld id="{5BCAD085-E8A6-8845-BD4E-CB4CCA059FC4}" type="datetimeFigureOut">
               <a:rPr lang="en-US" smtClean="0"/>
-              <a:t>12/12/2025</a:t>
+              <a:t>12/13/2025</a:t>
             </a:fld>
             <a:endParaRPr lang="en-US"/>
           </a:p>
@@ -5796,6 +5796,16 @@
 <file path=ppt/slides/slide2.xml><?xml version="1.0" encoding="utf-8"?>
 <p:sld xmlns:a="http://schemas.openxmlformats.org/drawingml/2006/main" xmlns:r="http://schemas.openxmlformats.org/officeDocument/2006/relationships" xmlns:p="http://schemas.openxmlformats.org/presentationml/2006/main">
   <p:cSld>
+    <p:bg>
+      <p:bgPr>
+        <a:solidFill>
+          <a:schemeClr val="tx2">
+            <a:lumMod val="75000"/>
+          </a:schemeClr>
+        </a:solidFill>
+        <a:effectLst/>
+      </p:bgPr>
+    </p:bg>
     <p:spTree>
       <p:nvGrpSpPr>
         <p:cNvPr id="1" name=""/>
@@ -5839,7 +5849,7 @@
             <a:r>
               <a:rPr lang="en-US" dirty="0">
                 <a:solidFill>
-                  <a:srgbClr val="002060"/>
+                  <a:schemeClr val="bg1"/>
                 </a:solidFill>
                 <a:latin typeface="Consolas" panose="020B0609020204030204" pitchFamily="49" charset="0"/>
               </a:rPr>
@@ -5847,7 +5857,7 @@
             </a:r>
             <a:endParaRPr lang="en-UG" dirty="0">
               <a:solidFill>
-                <a:srgbClr val="002060"/>
+                <a:schemeClr val="bg1"/>
               </a:solidFill>
               <a:latin typeface="Consolas" panose="020B0609020204030204" pitchFamily="49" charset="0"/>
             </a:endParaRPr>
@@ -5887,6 +5897,11 @@
             </a:pPr>
             <a:r>
               <a:rPr lang="en-US" sz="1800" dirty="0">
+                <a:solidFill>
+                  <a:schemeClr val="bg1">
+                    <a:lumMod val="75000"/>
+                  </a:schemeClr>
+                </a:solidFill>
                 <a:effectLst/>
                 <a:latin typeface="Consolas" panose="020B0609020204030204" pitchFamily="49" charset="0"/>
               </a:rPr>
@@ -5900,6 +5915,11 @@
             </a:pPr>
             <a:r>
               <a:rPr lang="en-US" sz="1800" dirty="0">
+                <a:solidFill>
+                  <a:schemeClr val="bg1">
+                    <a:lumMod val="75000"/>
+                  </a:schemeClr>
+                </a:solidFill>
                 <a:latin typeface="Consolas" panose="020B0609020204030204" pitchFamily="49" charset="0"/>
               </a:rPr>
               <a:t>Customer Clustering: Segment customers based on purchasing behavior </a:t>
@@ -5912,6 +5932,11 @@
             </a:pPr>
             <a:r>
               <a:rPr lang="en-US" sz="1800" dirty="0">
+                <a:solidFill>
+                  <a:schemeClr val="bg1">
+                    <a:lumMod val="75000"/>
+                  </a:schemeClr>
+                </a:solidFill>
                 <a:latin typeface="Consolas" panose="020B0609020204030204" pitchFamily="49" charset="0"/>
               </a:rPr>
               <a:t>Deep Learning Embeddings:</a:t>
@@ -5924,6 +5949,11 @@
             </a:pPr>
             <a:r>
               <a:rPr lang="en-US" sz="1800" dirty="0">
+                <a:solidFill>
+                  <a:schemeClr val="bg1">
+                    <a:lumMod val="75000"/>
+                  </a:schemeClr>
+                </a:solidFill>
                 <a:latin typeface="Consolas" panose="020B0609020204030204" pitchFamily="49" charset="0"/>
               </a:rPr>
               <a:t>Association Rule Mining</a:t>
@@ -5935,6 +5965,11 @@
               <a:buAutoNum type="arabicPeriod"/>
             </a:pPr>
             <a:endParaRPr lang="en-US" sz="1800" dirty="0">
+              <a:solidFill>
+                <a:schemeClr val="bg1">
+                  <a:lumMod val="75000"/>
+                </a:schemeClr>
+              </a:solidFill>
               <a:latin typeface="Consolas" panose="020B0609020204030204" pitchFamily="49" charset="0"/>
             </a:endParaRPr>
           </a:p>
@@ -5944,12 +5979,22 @@
             </a:pPr>
             <a:r>
               <a:rPr lang="en-US" sz="1800" b="1" dirty="0">
+                <a:solidFill>
+                  <a:schemeClr val="bg1">
+                    <a:lumMod val="75000"/>
+                  </a:schemeClr>
+                </a:solidFill>
                 <a:latin typeface="Consolas" panose="020B0609020204030204" pitchFamily="49" charset="0"/>
               </a:rPr>
               <a:t>Objective</a:t>
             </a:r>
             <a:r>
               <a:rPr lang="en-US" sz="1800" dirty="0">
+                <a:solidFill>
+                  <a:schemeClr val="bg1">
+                    <a:lumMod val="75000"/>
+                  </a:schemeClr>
+                </a:solidFill>
                 <a:latin typeface="Consolas" panose="020B0609020204030204" pitchFamily="49" charset="0"/>
               </a:rPr>
               <a:t>: analyze customer purchasing behavior to create marketing insights using clustering, deep embeddings, and association rules.</a:t>
@@ -5967,11 +6012,21 @@
             </a:pPr>
             <a:r>
               <a:rPr lang="en-US" sz="1800" b="1" dirty="0">
+                <a:solidFill>
+                  <a:schemeClr val="bg1">
+                    <a:lumMod val="75000"/>
+                  </a:schemeClr>
+                </a:solidFill>
                 <a:latin typeface="Consolas" panose="020B0609020204030204" pitchFamily="49" charset="0"/>
               </a:rPr>
               <a:t>The assignment requires the following components:</a:t>
             </a:r>
             <a:endParaRPr lang="en-UG" sz="1800" b="1" dirty="0">
+              <a:solidFill>
+                <a:schemeClr val="bg1">
+                  <a:lumMod val="75000"/>
+                </a:schemeClr>
+              </a:solidFill>
               <a:latin typeface="Consolas" panose="020B0609020204030204" pitchFamily="49" charset="0"/>
             </a:endParaRPr>
           </a:p>
@@ -5986,11 +6041,21 @@
             </a:pPr>
             <a:r>
               <a:rPr lang="en-US" sz="1800" dirty="0">
+                <a:solidFill>
+                  <a:schemeClr val="bg1">
+                    <a:lumMod val="75000"/>
+                  </a:schemeClr>
+                </a:solidFill>
                 <a:latin typeface="Consolas" panose="020B0609020204030204" pitchFamily="49" charset="0"/>
               </a:rPr>
               <a:t>Data Cleaning and Clustering.</a:t>
             </a:r>
             <a:endParaRPr lang="en-UG" sz="1800" dirty="0">
+              <a:solidFill>
+                <a:schemeClr val="bg1">
+                  <a:lumMod val="75000"/>
+                </a:schemeClr>
+              </a:solidFill>
               <a:latin typeface="Consolas" panose="020B0609020204030204" pitchFamily="49" charset="0"/>
             </a:endParaRPr>
           </a:p>
@@ -6005,11 +6070,21 @@
             </a:pPr>
             <a:r>
               <a:rPr lang="en-US" sz="1800" dirty="0">
+                <a:solidFill>
+                  <a:schemeClr val="bg1">
+                    <a:lumMod val="75000"/>
+                  </a:schemeClr>
+                </a:solidFill>
                 <a:latin typeface="Consolas" panose="020B0609020204030204" pitchFamily="49" charset="0"/>
               </a:rPr>
               <a:t>Deep Embedding Clustering.</a:t>
             </a:r>
             <a:endParaRPr lang="en-UG" sz="1800" dirty="0">
+              <a:solidFill>
+                <a:schemeClr val="bg1">
+                  <a:lumMod val="75000"/>
+                </a:schemeClr>
+              </a:solidFill>
               <a:latin typeface="Consolas" panose="020B0609020204030204" pitchFamily="49" charset="0"/>
             </a:endParaRPr>
           </a:p>
@@ -6024,6 +6099,11 @@
             </a:pPr>
             <a:r>
               <a:rPr lang="en-US" sz="1800" dirty="0">
+                <a:solidFill>
+                  <a:schemeClr val="bg1">
+                    <a:lumMod val="75000"/>
+                  </a:schemeClr>
+                </a:solidFill>
                 <a:latin typeface="Consolas" panose="020B0609020204030204" pitchFamily="49" charset="0"/>
               </a:rPr>
               <a:t>Association Rule Mining. </a:t>
@@ -6040,21 +6120,41 @@
             </a:pPr>
             <a:r>
               <a:rPr lang="en-US" sz="1800" dirty="0">
+                <a:solidFill>
+                  <a:schemeClr val="bg1">
+                    <a:lumMod val="75000"/>
+                  </a:schemeClr>
+                </a:solidFill>
                 <a:latin typeface="Consolas" panose="020B0609020204030204" pitchFamily="49" charset="0"/>
               </a:rPr>
               <a:t>Interpretation and Presentations.</a:t>
             </a:r>
             <a:br>
               <a:rPr lang="en-US" sz="1800" dirty="0">
+                <a:solidFill>
+                  <a:schemeClr val="bg1">
+                    <a:lumMod val="75000"/>
+                  </a:schemeClr>
+                </a:solidFill>
                 <a:latin typeface="Consolas" panose="020B0609020204030204" pitchFamily="49" charset="0"/>
               </a:rPr>
             </a:br>
             <a:endParaRPr lang="en-UG" sz="1800" dirty="0">
+              <a:solidFill>
+                <a:schemeClr val="bg1">
+                  <a:lumMod val="75000"/>
+                </a:schemeClr>
+              </a:solidFill>
               <a:latin typeface="Consolas" panose="020B0609020204030204" pitchFamily="49" charset="0"/>
             </a:endParaRPr>
           </a:p>
           <a:p>
             <a:endParaRPr lang="en-UG" sz="1800" dirty="0">
+              <a:solidFill>
+                <a:schemeClr val="bg1">
+                  <a:lumMod val="75000"/>
+                </a:schemeClr>
+              </a:solidFill>
               <a:latin typeface="Consolas" panose="020B0609020204030204" pitchFamily="49" charset="0"/>
             </a:endParaRPr>
           </a:p>
@@ -7604,7 +7704,7 @@
         </p:nvSpPr>
         <p:spPr>
           <a:xfrm>
-            <a:off x="640080" y="878689"/>
+            <a:off x="552994" y="853864"/>
             <a:ext cx="8133806" cy="1569660"/>
           </a:xfrm>
           <a:prstGeom prst="rect">
@@ -7728,7 +7828,7 @@
         </p:blipFill>
         <p:spPr>
           <a:xfrm>
-            <a:off x="724747" y="2713196"/>
+            <a:off x="311090" y="2423524"/>
             <a:ext cx="4860375" cy="1201783"/>
           </a:xfrm>
           <a:prstGeom prst="rect">
@@ -7758,8 +7858,8 @@
         </p:blipFill>
         <p:spPr>
           <a:xfrm>
-            <a:off x="4798578" y="2633133"/>
-            <a:ext cx="4345422" cy="3679952"/>
+            <a:off x="5247665" y="3579136"/>
+            <a:ext cx="3803710" cy="3221199"/>
           </a:xfrm>
           <a:prstGeom prst="rect">
             <a:avLst/>

</xml_diff>